<commit_message>
Added the sex appeal
</commit_message>
<xml_diff>
--- a/presentation/GP Hackathon - Hitch - Presentation.pptx
+++ b/presentation/GP Hackathon - Hitch - Presentation.pptx
@@ -13,7 +13,9 @@
     <p:sldId id="266" r:id="rId7"/>
     <p:sldId id="265" r:id="rId8"/>
     <p:sldId id="260" r:id="rId9"/>
-    <p:sldId id="267" r:id="rId10"/>
+    <p:sldId id="269" r:id="rId10"/>
+    <p:sldId id="267" r:id="rId11"/>
+    <p:sldId id="268" r:id="rId12"/>
   </p:sldIdLst>
   <p:sldSz cx="9144000" cy="5143500" type="screen16x9"/>
   <p:notesSz cx="6858000" cy="9144000"/>
@@ -3175,6 +3177,420 @@
 </p:sld>
 </file>
 
+<file path=ppt/slides/slide10.xml><?xml version="1.0" encoding="utf-8"?>
+<p:sld xmlns:a="http://schemas.openxmlformats.org/drawingml/2006/main" xmlns:r="http://schemas.openxmlformats.org/officeDocument/2006/relationships" xmlns:p="http://schemas.openxmlformats.org/presentationml/2006/main">
+  <p:cSld>
+    <p:bg>
+      <p:bgPr>
+        <a:gradFill flip="none" rotWithShape="1">
+          <a:gsLst>
+            <a:gs pos="0">
+              <a:srgbClr val="000000"/>
+            </a:gs>
+            <a:gs pos="100000">
+              <a:srgbClr val="24252A"/>
+            </a:gs>
+          </a:gsLst>
+          <a:lin ang="2940000" scaled="0"/>
+          <a:tileRect/>
+        </a:gradFill>
+        <a:effectLst/>
+      </p:bgPr>
+    </p:bg>
+    <p:spTree>
+      <p:nvGrpSpPr>
+        <p:cNvPr id="1" name=""/>
+        <p:cNvGrpSpPr/>
+        <p:nvPr/>
+      </p:nvGrpSpPr>
+      <p:grpSpPr>
+        <a:xfrm>
+          <a:off x="0" y="0"/>
+          <a:ext cx="0" cy="0"/>
+          <a:chOff x="0" y="0"/>
+          <a:chExt cx="0" cy="0"/>
+        </a:xfrm>
+      </p:grpSpPr>
+      <p:pic>
+        <p:nvPicPr>
+          <p:cNvPr id="4" name="Picture 3" descr="logo.png"/>
+          <p:cNvPicPr>
+            <a:picLocks noChangeAspect="1"/>
+          </p:cNvPicPr>
+          <p:nvPr/>
+        </p:nvPicPr>
+        <p:blipFill>
+          <a:blip r:embed="rId2">
+            <a:extLst>
+              <a:ext uri="{28A0092B-C50C-407E-A947-70E740481C1C}">
+                <a14:useLocalDpi xmlns:a14="http://schemas.microsoft.com/office/drawing/2010/main" val="0"/>
+              </a:ext>
+            </a:extLst>
+          </a:blip>
+          <a:stretch>
+            <a:fillRect/>
+          </a:stretch>
+        </p:blipFill>
+        <p:spPr>
+          <a:xfrm>
+            <a:off x="247028" y="226309"/>
+            <a:ext cx="1641305" cy="574457"/>
+          </a:xfrm>
+          <a:prstGeom prst="rect">
+            <a:avLst/>
+          </a:prstGeom>
+        </p:spPr>
+      </p:pic>
+      <p:sp>
+        <p:nvSpPr>
+          <p:cNvPr id="3" name="TextBox 2"/>
+          <p:cNvSpPr txBox="1"/>
+          <p:nvPr/>
+        </p:nvSpPr>
+        <p:spPr>
+          <a:xfrm>
+            <a:off x="1244961" y="1093636"/>
+            <a:ext cx="6542321" cy="3693319"/>
+          </a:xfrm>
+          <a:prstGeom prst="rect">
+            <a:avLst/>
+          </a:prstGeom>
+          <a:noFill/>
+        </p:spPr>
+        <p:txBody>
+          <a:bodyPr wrap="square" rtlCol="0">
+            <a:spAutoFit/>
+          </a:bodyPr>
+          <a:lstStyle/>
+          <a:p>
+            <a:r>
+              <a:rPr lang="en-US" dirty="0" smtClean="0">
+                <a:solidFill>
+                  <a:schemeClr val="bg1"/>
+                </a:solidFill>
+              </a:rPr>
+              <a:t>Combined Statistics:</a:t>
+            </a:r>
+          </a:p>
+          <a:p>
+            <a:pPr marL="285750" indent="-285750">
+              <a:buFont typeface="Arial"/>
+              <a:buChar char="•"/>
+            </a:pPr>
+            <a:r>
+              <a:rPr lang="en-US" dirty="0" smtClean="0">
+                <a:solidFill>
+                  <a:schemeClr val="bg1"/>
+                </a:solidFill>
+              </a:rPr>
+              <a:t>Coffees: 9</a:t>
+            </a:r>
+          </a:p>
+          <a:p>
+            <a:pPr marL="285750" indent="-285750">
+              <a:buFont typeface="Arial"/>
+              <a:buChar char="•"/>
+            </a:pPr>
+            <a:r>
+              <a:rPr lang="en-US" dirty="0" smtClean="0">
+                <a:solidFill>
+                  <a:schemeClr val="bg1"/>
+                </a:solidFill>
+              </a:rPr>
+              <a:t>Hours of sleep: 5.25</a:t>
+            </a:r>
+          </a:p>
+          <a:p>
+            <a:pPr marL="285750" indent="-285750">
+              <a:buFont typeface="Arial"/>
+              <a:buChar char="•"/>
+            </a:pPr>
+            <a:r>
+              <a:rPr lang="en-US" dirty="0" smtClean="0">
+                <a:solidFill>
+                  <a:schemeClr val="bg1"/>
+                </a:solidFill>
+              </a:rPr>
+              <a:t>Lines of code written</a:t>
+            </a:r>
+          </a:p>
+          <a:p>
+            <a:pPr marL="742950" lvl="1" indent="-285750">
+              <a:buFont typeface="Arial"/>
+              <a:buChar char="•"/>
+            </a:pPr>
+            <a:r>
+              <a:rPr lang="en-US" dirty="0" smtClean="0">
+                <a:solidFill>
+                  <a:schemeClr val="bg1"/>
+                </a:solidFill>
+              </a:rPr>
+              <a:t>Front End: 797</a:t>
+            </a:r>
+          </a:p>
+          <a:p>
+            <a:pPr marL="742950" lvl="1" indent="-285750">
+              <a:buFont typeface="Arial"/>
+              <a:buChar char="•"/>
+            </a:pPr>
+            <a:r>
+              <a:rPr lang="en-US" dirty="0" smtClean="0">
+                <a:solidFill>
+                  <a:schemeClr val="bg1"/>
+                </a:solidFill>
+              </a:rPr>
+              <a:t>Back End: </a:t>
+            </a:r>
+            <a:r>
+              <a:rPr lang="en-US" dirty="0" smtClean="0">
+                <a:solidFill>
+                  <a:schemeClr val="bg1"/>
+                </a:solidFill>
+              </a:rPr>
+              <a:t>106</a:t>
+            </a:r>
+            <a:endParaRPr lang="en-US" dirty="0" smtClean="0">
+              <a:solidFill>
+                <a:schemeClr val="bg1"/>
+              </a:solidFill>
+            </a:endParaRPr>
+          </a:p>
+          <a:p>
+            <a:pPr marL="285750" indent="-285750">
+              <a:buFont typeface="Arial"/>
+              <a:buChar char="•"/>
+            </a:pPr>
+            <a:r>
+              <a:rPr lang="en-US" dirty="0" smtClean="0">
+                <a:solidFill>
+                  <a:schemeClr val="bg1"/>
+                </a:solidFill>
+              </a:rPr>
+              <a:t>Hours in this building: 38</a:t>
+            </a:r>
+          </a:p>
+          <a:p>
+            <a:pPr marL="285750" indent="-285750">
+              <a:buFont typeface="Arial"/>
+              <a:buChar char="•"/>
+            </a:pPr>
+            <a:endParaRPr lang="en-US" dirty="0" smtClean="0">
+              <a:solidFill>
+                <a:schemeClr val="bg1"/>
+              </a:solidFill>
+            </a:endParaRPr>
+          </a:p>
+          <a:p>
+            <a:endParaRPr lang="en-US" dirty="0" smtClean="0">
+              <a:solidFill>
+                <a:schemeClr val="bg1"/>
+              </a:solidFill>
+            </a:endParaRPr>
+          </a:p>
+          <a:p>
+            <a:endParaRPr lang="en-US" dirty="0">
+              <a:solidFill>
+                <a:schemeClr val="bg1"/>
+              </a:solidFill>
+            </a:endParaRPr>
+          </a:p>
+          <a:p>
+            <a:endParaRPr lang="en-US" dirty="0" smtClean="0">
+              <a:solidFill>
+                <a:schemeClr val="bg1"/>
+              </a:solidFill>
+            </a:endParaRPr>
+          </a:p>
+          <a:p>
+            <a:r>
+              <a:rPr lang="en-US" dirty="0" smtClean="0">
+                <a:solidFill>
+                  <a:schemeClr val="bg1"/>
+                </a:solidFill>
+              </a:rPr>
+              <a:t>https://</a:t>
+            </a:r>
+            <a:r>
+              <a:rPr lang="en-US" dirty="0" err="1" smtClean="0">
+                <a:solidFill>
+                  <a:schemeClr val="bg1"/>
+                </a:solidFill>
+              </a:rPr>
+              <a:t>github.com</a:t>
+            </a:r>
+            <a:r>
+              <a:rPr lang="en-US" dirty="0" smtClean="0">
+                <a:solidFill>
+                  <a:schemeClr val="bg1"/>
+                </a:solidFill>
+              </a:rPr>
+              <a:t>/gtg489w/</a:t>
+            </a:r>
+            <a:r>
+              <a:rPr lang="en-US" dirty="0" err="1" smtClean="0">
+                <a:solidFill>
+                  <a:schemeClr val="bg1"/>
+                </a:solidFill>
+              </a:rPr>
+              <a:t>GlobalPaymentsHackathon</a:t>
+            </a:r>
+            <a:endParaRPr lang="en-US" dirty="0" smtClean="0">
+              <a:solidFill>
+                <a:schemeClr val="bg1"/>
+              </a:solidFill>
+            </a:endParaRPr>
+          </a:p>
+          <a:p>
+            <a:endParaRPr lang="en-US" dirty="0">
+              <a:solidFill>
+                <a:schemeClr val="bg1"/>
+              </a:solidFill>
+            </a:endParaRPr>
+          </a:p>
+        </p:txBody>
+      </p:sp>
+    </p:spTree>
+    <p:extLst>
+      <p:ext uri="{BB962C8B-B14F-4D97-AF65-F5344CB8AC3E}">
+        <p14:creationId xmlns:p14="http://schemas.microsoft.com/office/powerpoint/2010/main" val="2546936724"/>
+      </p:ext>
+    </p:extLst>
+  </p:cSld>
+  <p:clrMapOvr>
+    <a:masterClrMapping/>
+  </p:clrMapOvr>
+  <p:timing>
+    <p:tnLst>
+      <p:par>
+        <p:cTn xmlns:p14="http://schemas.microsoft.com/office/powerpoint/2010/main" id="1" dur="indefinite" restart="never" nodeType="tmRoot"/>
+      </p:par>
+    </p:tnLst>
+  </p:timing>
+</p:sld>
+</file>
+
+<file path=ppt/slides/slide11.xml><?xml version="1.0" encoding="utf-8"?>
+<p:sld xmlns:a="http://schemas.openxmlformats.org/drawingml/2006/main" xmlns:r="http://schemas.openxmlformats.org/officeDocument/2006/relationships" xmlns:p="http://schemas.openxmlformats.org/presentationml/2006/main">
+  <p:cSld>
+    <p:bg>
+      <p:bgPr>
+        <a:gradFill flip="none" rotWithShape="1">
+          <a:gsLst>
+            <a:gs pos="0">
+              <a:srgbClr val="000000"/>
+            </a:gs>
+            <a:gs pos="100000">
+              <a:srgbClr val="24252A"/>
+            </a:gs>
+          </a:gsLst>
+          <a:lin ang="2940000" scaled="0"/>
+          <a:tileRect/>
+        </a:gradFill>
+        <a:effectLst/>
+      </p:bgPr>
+    </p:bg>
+    <p:spTree>
+      <p:nvGrpSpPr>
+        <p:cNvPr id="1" name=""/>
+        <p:cNvGrpSpPr/>
+        <p:nvPr/>
+      </p:nvGrpSpPr>
+      <p:grpSpPr>
+        <a:xfrm>
+          <a:off x="0" y="0"/>
+          <a:ext cx="0" cy="0"/>
+          <a:chOff x="0" y="0"/>
+          <a:chExt cx="0" cy="0"/>
+        </a:xfrm>
+      </p:grpSpPr>
+      <p:pic>
+        <p:nvPicPr>
+          <p:cNvPr id="4" name="Picture 3" descr="logo.png"/>
+          <p:cNvPicPr>
+            <a:picLocks noChangeAspect="1"/>
+          </p:cNvPicPr>
+          <p:nvPr/>
+        </p:nvPicPr>
+        <p:blipFill>
+          <a:blip r:embed="rId2">
+            <a:extLst>
+              <a:ext uri="{28A0092B-C50C-407E-A947-70E740481C1C}">
+                <a14:useLocalDpi xmlns:a14="http://schemas.microsoft.com/office/drawing/2010/main" val="0"/>
+              </a:ext>
+            </a:extLst>
+          </a:blip>
+          <a:stretch>
+            <a:fillRect/>
+          </a:stretch>
+        </p:blipFill>
+        <p:spPr>
+          <a:xfrm>
+            <a:off x="247028" y="226309"/>
+            <a:ext cx="1641305" cy="574457"/>
+          </a:xfrm>
+          <a:prstGeom prst="rect">
+            <a:avLst/>
+          </a:prstGeom>
+        </p:spPr>
+      </p:pic>
+      <p:sp>
+        <p:nvSpPr>
+          <p:cNvPr id="3" name="TextBox 2"/>
+          <p:cNvSpPr txBox="1"/>
+          <p:nvPr/>
+        </p:nvSpPr>
+        <p:spPr>
+          <a:xfrm>
+            <a:off x="1244961" y="1093636"/>
+            <a:ext cx="6542321" cy="369332"/>
+          </a:xfrm>
+          <a:prstGeom prst="rect">
+            <a:avLst/>
+          </a:prstGeom>
+          <a:noFill/>
+        </p:spPr>
+        <p:txBody>
+          <a:bodyPr wrap="square" rtlCol="0">
+            <a:spAutoFit/>
+          </a:bodyPr>
+          <a:lstStyle/>
+          <a:p>
+            <a:r>
+              <a:rPr lang="en-US" dirty="0" smtClean="0">
+                <a:solidFill>
+                  <a:schemeClr val="bg1"/>
+                </a:solidFill>
+              </a:rPr>
+              <a:t>Appendix</a:t>
+            </a:r>
+            <a:endParaRPr lang="en-US" dirty="0">
+              <a:solidFill>
+                <a:schemeClr val="bg1"/>
+              </a:solidFill>
+            </a:endParaRPr>
+          </a:p>
+        </p:txBody>
+      </p:sp>
+    </p:spTree>
+    <p:extLst>
+      <p:ext uri="{BB962C8B-B14F-4D97-AF65-F5344CB8AC3E}">
+        <p14:creationId xmlns:p14="http://schemas.microsoft.com/office/powerpoint/2010/main" val="2097361829"/>
+      </p:ext>
+    </p:extLst>
+  </p:cSld>
+  <p:clrMapOvr>
+    <a:masterClrMapping/>
+  </p:clrMapOvr>
+  <p:timing>
+    <p:tnLst>
+      <p:par>
+        <p:cTn xmlns:p14="http://schemas.microsoft.com/office/powerpoint/2010/main" id="1" dur="indefinite" restart="never" nodeType="tmRoot"/>
+      </p:par>
+    </p:tnLst>
+  </p:timing>
+</p:sld>
+</file>
+
 <file path=ppt/slides/slide2.xml><?xml version="1.0" encoding="utf-8"?>
 <p:sld xmlns:a="http://schemas.openxmlformats.org/drawingml/2006/main" xmlns:r="http://schemas.openxmlformats.org/officeDocument/2006/relationships" xmlns:p="http://schemas.openxmlformats.org/presentationml/2006/main">
   <p:cSld>
@@ -3333,15 +3749,7 @@
                   <a:schemeClr val="bg1"/>
                 </a:solidFill>
               </a:rPr>
-              <a:t>Design, </a:t>
-            </a:r>
-            <a:r>
-              <a:rPr lang="en-US" dirty="0" smtClean="0">
-                <a:solidFill>
-                  <a:schemeClr val="bg1"/>
-                </a:solidFill>
-              </a:rPr>
-              <a:t>Mobile Apps</a:t>
+              <a:t>Design, Mobile Apps</a:t>
             </a:r>
             <a:endParaRPr lang="en-US" dirty="0">
               <a:solidFill>
@@ -3602,15 +4010,7 @@
                   <a:schemeClr val="bg1"/>
                 </a:solidFill>
               </a:rPr>
-              <a:t>Design, </a:t>
-            </a:r>
-            <a:r>
-              <a:rPr lang="en-US" dirty="0" smtClean="0">
-                <a:solidFill>
-                  <a:schemeClr val="bg1"/>
-                </a:solidFill>
-              </a:rPr>
-              <a:t>Mobile Apps</a:t>
+              <a:t>Design, Mobile Apps</a:t>
             </a:r>
             <a:endParaRPr lang="en-US" dirty="0">
               <a:solidFill>
@@ -4267,7 +4667,7 @@
         </p:blipFill>
         <p:spPr>
           <a:xfrm>
-            <a:off x="1735767" y="2760176"/>
+            <a:off x="2531028" y="2484464"/>
             <a:ext cx="2124535" cy="738276"/>
           </a:xfrm>
           <a:prstGeom prst="rect">
@@ -4291,7 +4691,7 @@
         </p:blipFill>
         <p:spPr>
           <a:xfrm>
-            <a:off x="301680" y="2550769"/>
+            <a:off x="1055166" y="2275057"/>
             <a:ext cx="1084284" cy="1219819"/>
           </a:xfrm>
           <a:prstGeom prst="rect">
@@ -4345,7 +4745,7 @@
         </p:blipFill>
         <p:spPr>
           <a:xfrm>
-            <a:off x="263682" y="4030663"/>
+            <a:off x="389007" y="4013953"/>
             <a:ext cx="2998725" cy="680745"/>
           </a:xfrm>
           <a:prstGeom prst="rect">
@@ -4403,7 +4803,7 @@
         </p:blipFill>
         <p:spPr>
           <a:xfrm>
-            <a:off x="4026138" y="2548514"/>
+            <a:off x="4821399" y="2272802"/>
             <a:ext cx="1747481" cy="1127576"/>
           </a:xfrm>
           <a:prstGeom prst="rect">
@@ -4433,7 +4833,7 @@
         </p:blipFill>
         <p:spPr>
           <a:xfrm>
-            <a:off x="5520586" y="2581934"/>
+            <a:off x="6122180" y="2272802"/>
             <a:ext cx="2425449" cy="1302124"/>
           </a:xfrm>
           <a:prstGeom prst="rect">
@@ -4617,8 +5017,8 @@
         </p:nvSpPr>
         <p:spPr>
           <a:xfrm>
-            <a:off x="1244961" y="1093636"/>
-            <a:ext cx="6542321" cy="369332"/>
+            <a:off x="2013664" y="2430425"/>
+            <a:ext cx="4770964" cy="369332"/>
           </a:xfrm>
           <a:prstGeom prst="rect">
             <a:avLst/>
@@ -4631,6 +5031,7 @@
           </a:bodyPr>
           <a:lstStyle/>
           <a:p>
+            <a:pPr algn="ctr"/>
             <a:r>
               <a:rPr lang="en-US" dirty="0" smtClean="0">
                 <a:solidFill>
@@ -4650,7 +5051,7 @@
     </p:spTree>
     <p:extLst>
       <p:ext uri="{BB962C8B-B14F-4D97-AF65-F5344CB8AC3E}">
-        <p14:creationId xmlns:p14="http://schemas.microsoft.com/office/powerpoint/2010/main" val="2546936724"/>
+        <p14:creationId xmlns:p14="http://schemas.microsoft.com/office/powerpoint/2010/main" val="3372134902"/>
       </p:ext>
     </p:extLst>
   </p:cSld>

</xml_diff>

<commit_message>
Updated repo with description text
</commit_message>
<xml_diff>
--- a/presentation/GP Hackathon - Hitch - Presentation.pptx
+++ b/presentation/GP Hackathon - Hitch - Presentation.pptx
@@ -3545,12 +3545,19 @@
         </p:nvSpPr>
         <p:spPr>
           <a:xfrm>
-            <a:off x="1336873" y="892494"/>
-            <a:ext cx="5155315" cy="2934061"/>
+            <a:off x="1535456" y="1310240"/>
+            <a:ext cx="5706775" cy="2934061"/>
           </a:xfrm>
           <a:prstGeom prst="rect">
             <a:avLst/>
           </a:prstGeom>
+          <a:solidFill>
+            <a:srgbClr val="FFFFFF"/>
+          </a:solidFill>
+          <a:ln>
+            <a:noFill/>
+          </a:ln>
+          <a:effectLst/>
         </p:spPr>
         <p:style>
           <a:lnRef idx="1">
@@ -3597,7 +3604,7 @@
         </p:blipFill>
         <p:spPr>
           <a:xfrm>
-            <a:off x="1470560" y="892494"/>
+            <a:off x="1794475" y="1226691"/>
             <a:ext cx="5123841" cy="6630853"/>
           </a:xfrm>
           <a:prstGeom prst="rect">

</xml_diff>